<commit_message>
updated ppt as per input
</commit_message>
<xml_diff>
--- a/project1.pptx
+++ b/project1.pptx
@@ -7,9 +7,9 @@
   <p:sldIdLst>
     <p:sldId id="256" r:id="rId2"/>
     <p:sldId id="260" r:id="rId3"/>
-    <p:sldId id="263" r:id="rId4"/>
-    <p:sldId id="258" r:id="rId5"/>
-    <p:sldId id="261" r:id="rId6"/>
+    <p:sldId id="258" r:id="rId4"/>
+    <p:sldId id="261" r:id="rId5"/>
+    <p:sldId id="263" r:id="rId6"/>
     <p:sldId id="262" r:id="rId7"/>
   </p:sldIdLst>
   <p:sldSz cx="12192000" cy="6858000"/>
@@ -264,7 +264,7 @@
           <a:p>
             <a:fld id="{04CFBF53-0F8A-1A4F-BA63-1C498E40C817}" type="datetimeFigureOut">
               <a:rPr lang="en-US" smtClean="0"/>
-              <a:t>11/3/20</a:t>
+              <a:t>11/4/20</a:t>
             </a:fld>
             <a:endParaRPr lang="en-US"/>
           </a:p>
@@ -462,7 +462,7 @@
           <a:p>
             <a:fld id="{04CFBF53-0F8A-1A4F-BA63-1C498E40C817}" type="datetimeFigureOut">
               <a:rPr lang="en-US" smtClean="0"/>
-              <a:t>11/3/20</a:t>
+              <a:t>11/4/20</a:t>
             </a:fld>
             <a:endParaRPr lang="en-US"/>
           </a:p>
@@ -670,7 +670,7 @@
           <a:p>
             <a:fld id="{04CFBF53-0F8A-1A4F-BA63-1C498E40C817}" type="datetimeFigureOut">
               <a:rPr lang="en-US" smtClean="0"/>
-              <a:t>11/3/20</a:t>
+              <a:t>11/4/20</a:t>
             </a:fld>
             <a:endParaRPr lang="en-US"/>
           </a:p>
@@ -868,7 +868,7 @@
           <a:p>
             <a:fld id="{04CFBF53-0F8A-1A4F-BA63-1C498E40C817}" type="datetimeFigureOut">
               <a:rPr lang="en-US" smtClean="0"/>
-              <a:t>11/3/20</a:t>
+              <a:t>11/4/20</a:t>
             </a:fld>
             <a:endParaRPr lang="en-US"/>
           </a:p>
@@ -1143,7 +1143,7 @@
           <a:p>
             <a:fld id="{04CFBF53-0F8A-1A4F-BA63-1C498E40C817}" type="datetimeFigureOut">
               <a:rPr lang="en-US" smtClean="0"/>
-              <a:t>11/3/20</a:t>
+              <a:t>11/4/20</a:t>
             </a:fld>
             <a:endParaRPr lang="en-US"/>
           </a:p>
@@ -1408,7 +1408,7 @@
           <a:p>
             <a:fld id="{04CFBF53-0F8A-1A4F-BA63-1C498E40C817}" type="datetimeFigureOut">
               <a:rPr lang="en-US" smtClean="0"/>
-              <a:t>11/3/20</a:t>
+              <a:t>11/4/20</a:t>
             </a:fld>
             <a:endParaRPr lang="en-US"/>
           </a:p>
@@ -1820,7 +1820,7 @@
           <a:p>
             <a:fld id="{04CFBF53-0F8A-1A4F-BA63-1C498E40C817}" type="datetimeFigureOut">
               <a:rPr lang="en-US" smtClean="0"/>
-              <a:t>11/3/20</a:t>
+              <a:t>11/4/20</a:t>
             </a:fld>
             <a:endParaRPr lang="en-US"/>
           </a:p>
@@ -1961,7 +1961,7 @@
           <a:p>
             <a:fld id="{04CFBF53-0F8A-1A4F-BA63-1C498E40C817}" type="datetimeFigureOut">
               <a:rPr lang="en-US" smtClean="0"/>
-              <a:t>11/3/20</a:t>
+              <a:t>11/4/20</a:t>
             </a:fld>
             <a:endParaRPr lang="en-US"/>
           </a:p>
@@ -2074,7 +2074,7 @@
           <a:p>
             <a:fld id="{04CFBF53-0F8A-1A4F-BA63-1C498E40C817}" type="datetimeFigureOut">
               <a:rPr lang="en-US" smtClean="0"/>
-              <a:t>11/3/20</a:t>
+              <a:t>11/4/20</a:t>
             </a:fld>
             <a:endParaRPr lang="en-US"/>
           </a:p>
@@ -2385,7 +2385,7 @@
           <a:p>
             <a:fld id="{04CFBF53-0F8A-1A4F-BA63-1C498E40C817}" type="datetimeFigureOut">
               <a:rPr lang="en-US" smtClean="0"/>
-              <a:t>11/3/20</a:t>
+              <a:t>11/4/20</a:t>
             </a:fld>
             <a:endParaRPr lang="en-US"/>
           </a:p>
@@ -2673,7 +2673,7 @@
           <a:p>
             <a:fld id="{04CFBF53-0F8A-1A4F-BA63-1C498E40C817}" type="datetimeFigureOut">
               <a:rPr lang="en-US" smtClean="0"/>
-              <a:t>11/3/20</a:t>
+              <a:t>11/4/20</a:t>
             </a:fld>
             <a:endParaRPr lang="en-US"/>
           </a:p>
@@ -2914,7 +2914,7 @@
           <a:p>
             <a:fld id="{04CFBF53-0F8A-1A4F-BA63-1C498E40C817}" type="datetimeFigureOut">
               <a:rPr lang="en-US" smtClean="0"/>
-              <a:t>11/3/20</a:t>
+              <a:t>11/4/20</a:t>
             </a:fld>
             <a:endParaRPr lang="en-US"/>
           </a:p>
@@ -3458,15 +3458,7 @@
             </a:pPr>
             <a:r>
               <a:rPr lang="en-US" dirty="0"/>
-              <a:t>Support for Bitcoin, Ethereum, </a:t>
-            </a:r>
-            <a:r>
-              <a:rPr lang="en-US" dirty="0" err="1"/>
-              <a:t>litecoin</a:t>
-            </a:r>
-            <a:r>
-              <a:rPr lang="en-US" dirty="0"/>
-              <a:t>, Bitcoin cash</a:t>
+              <a:t>Support for Bitcoin, Ethereum, Litecoin, Bitcoin cash</a:t>
             </a:r>
           </a:p>
           <a:p>
@@ -3497,7 +3489,7 @@
             </a:pPr>
             <a:r>
               <a:rPr lang="en-US" dirty="0"/>
-              <a:t>Real time data provided by Industry leaders Yahoo Finance and Coinranking</a:t>
+              <a:t>Real time data provided by Tiingo and Coinranking</a:t>
             </a:r>
           </a:p>
           <a:p>
@@ -3612,7 +3604,7 @@
         </p:spPr>
         <p:txBody>
           <a:bodyPr>
-            <a:normAutofit lnSpcReduction="10000"/>
+            <a:normAutofit/>
           </a:bodyPr>
           <a:lstStyle/>
           <a:p>
@@ -3629,7 +3621,7 @@
             </a:pPr>
             <a:r>
               <a:rPr lang="en-US" dirty="0"/>
-              <a:t>Indexed DB – Table with Primary key and identity</a:t>
+              <a:t>IndexedDB – Table with Primary key and identity</a:t>
             </a:r>
           </a:p>
           <a:p>
@@ -3658,12 +3650,8 @@
               <a:buChar char="•"/>
             </a:pPr>
             <a:r>
-              <a:rPr lang="en-US" dirty="0" err="1"/>
-              <a:t>Jquery</a:t>
-            </a:r>
-            <a:r>
               <a:rPr lang="en-US" dirty="0"/>
-              <a:t> for UI</a:t>
+              <a:t>jquery for UI</a:t>
             </a:r>
           </a:p>
           <a:p>
@@ -3673,7 +3661,7 @@
             </a:pPr>
             <a:r>
               <a:rPr lang="en-US" dirty="0"/>
-              <a:t>Frontend Framework</a:t>
+              <a:t>Foundation CSS Framework, mobile-first API</a:t>
             </a:r>
           </a:p>
           <a:p>
@@ -3692,12 +3680,8 @@
               <a:buChar char="•"/>
             </a:pPr>
             <a:r>
-              <a:rPr lang="en-US" dirty="0" err="1"/>
-              <a:t>Async</a:t>
-            </a:r>
-            <a:r>
               <a:rPr lang="en-US" dirty="0"/>
-              <a:t> and await, promises</a:t>
+              <a:t>async and await, promises</a:t>
             </a:r>
           </a:p>
           <a:p>
@@ -3707,13 +3691,8 @@
             </a:pPr>
             <a:r>
               <a:rPr lang="en-US" dirty="0"/>
-              <a:t>Real time stock quotes provider – </a:t>
-            </a:r>
-            <a:r>
-              <a:rPr lang="en-US" dirty="0" err="1"/>
-              <a:t>Tiingo</a:t>
-            </a:r>
-            <a:endParaRPr lang="en-US" dirty="0"/>
+              <a:t>Real time stock quotes provider – Tiingo</a:t>
+            </a:r>
           </a:p>
           <a:p>
             <a:pPr marL="800100" lvl="1" indent="-342900" algn="l">
@@ -3722,21 +3701,12 @@
             </a:pPr>
             <a:r>
               <a:rPr lang="en-US" dirty="0"/>
-              <a:t>Real Time Crypto Quotes provider – Coinranking</a:t>
-            </a:r>
-          </a:p>
-          <a:p>
-            <a:pPr marL="800100" lvl="1" indent="-342900" algn="l">
-              <a:buFont typeface="Arial" panose="020B0604020202020204" pitchFamily="34" charset="0"/>
-              <a:buChar char="•"/>
-            </a:pPr>
-            <a:r>
-              <a:rPr lang="en-US" dirty="0"/>
-              <a:t>Supported platforms – iOS, Android, Chrome, IE Edge</a:t>
-            </a:r>
-          </a:p>
-          <a:p>
-            <a:pPr lvl="1" algn="l"/>
+              <a:t>Real Time Crypto Quotes provider – </a:t>
+            </a:r>
+            <a:r>
+              <a:rPr lang="en-US"/>
+              <a:t>CoinRanking</a:t>
+            </a:r>
             <a:endParaRPr lang="en-US" dirty="0"/>
           </a:p>
           <a:p>
@@ -3895,7 +3865,7 @@
         </p:nvSpPr>
         <p:spPr>
           <a:xfrm>
-            <a:off x="890338" y="232026"/>
+            <a:off x="902369" y="219994"/>
             <a:ext cx="10030326" cy="694406"/>
           </a:xfrm>
         </p:spPr>
@@ -3908,107 +3878,15 @@
             <a:pPr algn="l"/>
             <a:r>
               <a:rPr lang="en-US" sz="2800" b="1" dirty="0"/>
-              <a:t>Lessons Learned</a:t>
-            </a:r>
-          </a:p>
-        </p:txBody>
-      </p:sp>
-      <p:sp>
-        <p:nvSpPr>
-          <p:cNvPr id="3" name="Subtitle 2">
-            <a:extLst>
-              <a:ext uri="{FF2B5EF4-FFF2-40B4-BE49-F238E27FC236}">
-                <a16:creationId xmlns:a16="http://schemas.microsoft.com/office/drawing/2014/main" id="{0FF8EAE3-E5EF-0E4D-9043-3F63905DAA48}"/>
-              </a:ext>
-            </a:extLst>
-          </p:cNvPr>
-          <p:cNvSpPr>
-            <a:spLocks noGrp="1"/>
-          </p:cNvSpPr>
-          <p:nvPr>
-            <p:ph type="subTitle" idx="1"/>
-          </p:nvPr>
-        </p:nvSpPr>
-        <p:spPr>
-          <a:xfrm>
-            <a:off x="1355558" y="1070811"/>
-            <a:ext cx="9312442" cy="5474367"/>
-          </a:xfrm>
-        </p:spPr>
-        <p:txBody>
-          <a:bodyPr>
-            <a:normAutofit/>
-          </a:bodyPr>
-          <a:lstStyle/>
-          <a:p>
-            <a:pPr marL="342900" indent="-342900" algn="l">
-              <a:buFont typeface="Arial" panose="020B0604020202020204" pitchFamily="34" charset="0"/>
-              <a:buChar char="•"/>
-            </a:pPr>
-            <a:endParaRPr lang="en-US" dirty="0"/>
-          </a:p>
-          <a:p>
-            <a:pPr marL="457200" lvl="2" algn="l">
-              <a:spcBef>
-                <a:spcPts val="1000"/>
-              </a:spcBef>
-            </a:pPr>
-            <a:endParaRPr lang="en-US" sz="2200" dirty="0"/>
-          </a:p>
-          <a:p>
-            <a:pPr marL="457200" lvl="2" algn="l">
-              <a:spcBef>
-                <a:spcPts val="1000"/>
-              </a:spcBef>
-            </a:pPr>
-            <a:endParaRPr lang="en-US" sz="2200" dirty="0"/>
-          </a:p>
-          <a:p>
-            <a:pPr marL="800100" lvl="2" indent="-342900" algn="l">
-              <a:spcBef>
-                <a:spcPts val="1000"/>
-              </a:spcBef>
-              <a:buFont typeface="Arial" panose="020B0604020202020204" pitchFamily="34" charset="0"/>
-              <a:buChar char="•"/>
-            </a:pPr>
-            <a:endParaRPr lang="en-US" sz="2200" dirty="0"/>
-          </a:p>
-          <a:p>
-            <a:pPr marL="800100" lvl="2" indent="-342900" algn="l">
-              <a:spcBef>
-                <a:spcPts val="1000"/>
-              </a:spcBef>
-              <a:buFont typeface="Arial" panose="020B0604020202020204" pitchFamily="34" charset="0"/>
-              <a:buChar char="•"/>
-            </a:pPr>
-            <a:endParaRPr lang="en-US" sz="2200" dirty="0"/>
-          </a:p>
-          <a:p>
-            <a:pPr marL="800100" lvl="2" indent="-342900" algn="l">
-              <a:spcBef>
-                <a:spcPts val="1000"/>
-              </a:spcBef>
-              <a:buFont typeface="Arial" panose="020B0604020202020204" pitchFamily="34" charset="0"/>
-              <a:buChar char="•"/>
-            </a:pPr>
-            <a:endParaRPr lang="en-US" sz="2200" dirty="0"/>
-          </a:p>
-          <a:p>
-            <a:pPr marL="800100" lvl="2" indent="-342900" algn="l">
-              <a:spcBef>
-                <a:spcPts val="1000"/>
-              </a:spcBef>
-              <a:buFont typeface="Arial" panose="020B0604020202020204" pitchFamily="34" charset="0"/>
-              <a:buChar char="•"/>
-            </a:pPr>
-            <a:endParaRPr lang="en-US" sz="2200" dirty="0"/>
+              <a:t>Screen Shot – Main Page</a:t>
+            </a:r>
           </a:p>
         </p:txBody>
       </p:sp>
     </p:spTree>
     <p:extLst>
       <p:ext uri="{BB962C8B-B14F-4D97-AF65-F5344CB8AC3E}">
-        <p14:creationId xmlns:p14="http://schemas.microsoft.com/office/powerpoint/2010/main" val="2894583720"/>
+        <p14:creationId xmlns:p14="http://schemas.microsoft.com/office/powerpoint/2010/main" val="1926872382"/>
       </p:ext>
     </p:extLst>
   </p:cSld>
@@ -4065,8 +3943,8 @@
           <a:p>
             <a:pPr algn="l"/>
             <a:r>
-              <a:rPr lang="en-US" sz="2800" dirty="0"/>
-              <a:t>Screen Shots - Placeholder</a:t>
+              <a:rPr lang="en-US" sz="2800" b="1" dirty="0"/>
+              <a:t>Screen Shot – Stock &amp; Crypto Info</a:t>
             </a:r>
           </a:p>
         </p:txBody>
@@ -4074,7 +3952,7 @@
     </p:spTree>
     <p:extLst>
       <p:ext uri="{BB962C8B-B14F-4D97-AF65-F5344CB8AC3E}">
-        <p14:creationId xmlns:p14="http://schemas.microsoft.com/office/powerpoint/2010/main" val="1926872382"/>
+        <p14:creationId xmlns:p14="http://schemas.microsoft.com/office/powerpoint/2010/main" val="2206056012"/>
       </p:ext>
     </p:extLst>
   </p:cSld>
@@ -4119,7 +3997,7 @@
         </p:nvSpPr>
         <p:spPr>
           <a:xfrm>
-            <a:off x="902369" y="219994"/>
+            <a:off x="890338" y="232026"/>
             <a:ext cx="10030326" cy="694406"/>
           </a:xfrm>
         </p:spPr>
@@ -4131,16 +4009,108 @@
           <a:p>
             <a:pPr algn="l"/>
             <a:r>
-              <a:rPr lang="en-US" sz="2800" dirty="0"/>
-              <a:t>Screen Shots - Placeholder</a:t>
-            </a:r>
+              <a:rPr lang="en-US" sz="2800" b="1" dirty="0"/>
+              <a:t>Lessons Learned</a:t>
+            </a:r>
+          </a:p>
+        </p:txBody>
+      </p:sp>
+      <p:sp>
+        <p:nvSpPr>
+          <p:cNvPr id="3" name="Subtitle 2">
+            <a:extLst>
+              <a:ext uri="{FF2B5EF4-FFF2-40B4-BE49-F238E27FC236}">
+                <a16:creationId xmlns:a16="http://schemas.microsoft.com/office/drawing/2014/main" id="{0FF8EAE3-E5EF-0E4D-9043-3F63905DAA48}"/>
+              </a:ext>
+            </a:extLst>
+          </p:cNvPr>
+          <p:cNvSpPr>
+            <a:spLocks noGrp="1"/>
+          </p:cNvSpPr>
+          <p:nvPr>
+            <p:ph type="subTitle" idx="1"/>
+          </p:nvPr>
+        </p:nvSpPr>
+        <p:spPr>
+          <a:xfrm>
+            <a:off x="1355558" y="1070811"/>
+            <a:ext cx="9312442" cy="5474367"/>
+          </a:xfrm>
+        </p:spPr>
+        <p:txBody>
+          <a:bodyPr>
+            <a:normAutofit/>
+          </a:bodyPr>
+          <a:lstStyle/>
+          <a:p>
+            <a:pPr marL="342900" indent="-342900" algn="l">
+              <a:buFont typeface="Arial" panose="020B0604020202020204" pitchFamily="34" charset="0"/>
+              <a:buChar char="•"/>
+            </a:pPr>
+            <a:endParaRPr lang="en-US" dirty="0"/>
+          </a:p>
+          <a:p>
+            <a:pPr marL="457200" lvl="2" algn="l">
+              <a:spcBef>
+                <a:spcPts val="1000"/>
+              </a:spcBef>
+            </a:pPr>
+            <a:endParaRPr lang="en-US" sz="2200" dirty="0"/>
+          </a:p>
+          <a:p>
+            <a:pPr marL="457200" lvl="2" algn="l">
+              <a:spcBef>
+                <a:spcPts val="1000"/>
+              </a:spcBef>
+            </a:pPr>
+            <a:endParaRPr lang="en-US" sz="2200" dirty="0"/>
+          </a:p>
+          <a:p>
+            <a:pPr marL="800100" lvl="2" indent="-342900" algn="l">
+              <a:spcBef>
+                <a:spcPts val="1000"/>
+              </a:spcBef>
+              <a:buFont typeface="Arial" panose="020B0604020202020204" pitchFamily="34" charset="0"/>
+              <a:buChar char="•"/>
+            </a:pPr>
+            <a:endParaRPr lang="en-US" sz="2200" dirty="0"/>
+          </a:p>
+          <a:p>
+            <a:pPr marL="800100" lvl="2" indent="-342900" algn="l">
+              <a:spcBef>
+                <a:spcPts val="1000"/>
+              </a:spcBef>
+              <a:buFont typeface="Arial" panose="020B0604020202020204" pitchFamily="34" charset="0"/>
+              <a:buChar char="•"/>
+            </a:pPr>
+            <a:endParaRPr lang="en-US" sz="2200" dirty="0"/>
+          </a:p>
+          <a:p>
+            <a:pPr marL="800100" lvl="2" indent="-342900" algn="l">
+              <a:spcBef>
+                <a:spcPts val="1000"/>
+              </a:spcBef>
+              <a:buFont typeface="Arial" panose="020B0604020202020204" pitchFamily="34" charset="0"/>
+              <a:buChar char="•"/>
+            </a:pPr>
+            <a:endParaRPr lang="en-US" sz="2200" dirty="0"/>
+          </a:p>
+          <a:p>
+            <a:pPr marL="800100" lvl="2" indent="-342900" algn="l">
+              <a:spcBef>
+                <a:spcPts val="1000"/>
+              </a:spcBef>
+              <a:buFont typeface="Arial" panose="020B0604020202020204" pitchFamily="34" charset="0"/>
+              <a:buChar char="•"/>
+            </a:pPr>
+            <a:endParaRPr lang="en-US" sz="2200" dirty="0"/>
           </a:p>
         </p:txBody>
       </p:sp>
     </p:spTree>
     <p:extLst>
       <p:ext uri="{BB962C8B-B14F-4D97-AF65-F5344CB8AC3E}">
-        <p14:creationId xmlns:p14="http://schemas.microsoft.com/office/powerpoint/2010/main" val="2206056012"/>
+        <p14:creationId xmlns:p14="http://schemas.microsoft.com/office/powerpoint/2010/main" val="2894583720"/>
       </p:ext>
     </p:extLst>
   </p:cSld>

</xml_diff>